<commit_message>
This is a new commit for the ppt
</commit_message>
<xml_diff>
--- a/Documents for Progress/StatusReport_Eff_SignalOverBkg_AllMVA_allbtag_09_05_19.pptx
+++ b/Documents for Progress/StatusReport_Eff_SignalOverBkg_AllMVA_allbtag_09_05_19.pptx
@@ -825,10 +825,9 @@
           <a:lstStyle/>
           <a:p>
             <a:r>
-              <a:rPr lang="en-US" smtClean="0"/>
+              <a:rPr lang="en-US"/>
               <a:t>9/5/2019</a:t>
             </a:r>
-            <a:endParaRPr lang="en-US"/>
           </a:p>
         </p:txBody>
       </p:sp>
@@ -1037,10 +1036,9 @@
           <a:lstStyle/>
           <a:p>
             <a:r>
-              <a:rPr lang="en-US" smtClean="0"/>
+              <a:rPr lang="en-US"/>
               <a:t>9/5/2019</a:t>
             </a:r>
-            <a:endParaRPr lang="en-US"/>
           </a:p>
         </p:txBody>
       </p:sp>
@@ -1297,10 +1295,9 @@
           <a:lstStyle/>
           <a:p>
             <a:r>
-              <a:rPr lang="en-US" smtClean="0"/>
+              <a:rPr lang="en-US"/>
               <a:t>9/5/2019</a:t>
             </a:r>
-            <a:endParaRPr lang="en-US"/>
           </a:p>
         </p:txBody>
       </p:sp>
@@ -1471,10 +1468,9 @@
           <a:lstStyle/>
           <a:p>
             <a:r>
-              <a:rPr lang="en-US" smtClean="0"/>
+              <a:rPr lang="en-US"/>
               <a:t>9/5/2019</a:t>
             </a:r>
-            <a:endParaRPr lang="en-US"/>
           </a:p>
         </p:txBody>
       </p:sp>
@@ -1818,10 +1814,9 @@
           <a:lstStyle/>
           <a:p>
             <a:r>
-              <a:rPr lang="en-US" smtClean="0"/>
+              <a:rPr lang="en-US"/>
               <a:t>9/5/2019</a:t>
             </a:r>
-            <a:endParaRPr lang="en-US"/>
           </a:p>
         </p:txBody>
       </p:sp>
@@ -2097,10 +2092,9 @@
           <a:lstStyle/>
           <a:p>
             <a:r>
-              <a:rPr lang="en-US" smtClean="0"/>
+              <a:rPr lang="en-US"/>
               <a:t>9/5/2019</a:t>
             </a:r>
-            <a:endParaRPr lang="en-US"/>
           </a:p>
         </p:txBody>
       </p:sp>
@@ -2480,10 +2474,9 @@
           <a:lstStyle/>
           <a:p>
             <a:r>
-              <a:rPr lang="en-US" smtClean="0"/>
+              <a:rPr lang="en-US"/>
               <a:t>9/5/2019</a:t>
             </a:r>
-            <a:endParaRPr lang="en-US"/>
           </a:p>
         </p:txBody>
       </p:sp>
@@ -2602,10 +2595,9 @@
           <a:lstStyle/>
           <a:p>
             <a:r>
-              <a:rPr lang="en-US" smtClean="0"/>
+              <a:rPr lang="en-US"/>
               <a:t>9/5/2019</a:t>
             </a:r>
-            <a:endParaRPr lang="en-US"/>
           </a:p>
         </p:txBody>
       </p:sp>
@@ -2777,10 +2769,9 @@
           <a:lstStyle/>
           <a:p>
             <a:r>
-              <a:rPr lang="en-US" smtClean="0"/>
+              <a:rPr lang="en-US"/>
               <a:t>9/5/2019</a:t>
             </a:r>
-            <a:endParaRPr lang="en-US"/>
           </a:p>
         </p:txBody>
       </p:sp>
@@ -3135,10 +3126,9 @@
           </a:lstStyle>
           <a:p>
             <a:r>
-              <a:rPr lang="en-US" smtClean="0"/>
+              <a:rPr lang="en-US"/>
               <a:t>9/5/2019</a:t>
             </a:r>
-            <a:endParaRPr lang="en-US"/>
           </a:p>
         </p:txBody>
       </p:sp>
@@ -3516,10 +3506,9 @@
           <a:lstStyle/>
           <a:p>
             <a:r>
-              <a:rPr lang="en-US" smtClean="0"/>
+              <a:rPr lang="en-US"/>
               <a:t>9/5/2019</a:t>
             </a:r>
-            <a:endParaRPr lang="en-US"/>
           </a:p>
         </p:txBody>
       </p:sp>
@@ -3807,10 +3796,9 @@
           </a:lstStyle>
           <a:p>
             <a:r>
-              <a:rPr lang="en-US" smtClean="0"/>
+              <a:rPr lang="en-US"/>
               <a:t>9/5/2019</a:t>
             </a:r>
-            <a:endParaRPr lang="en-US"/>
           </a:p>
         </p:txBody>
       </p:sp>
@@ -4385,17 +4373,9 @@
               <a:rPr lang="en-US" sz="4200" dirty="0"/>
               <a:t> for several selection Categories</a:t>
             </a:r>
-            <a:r>
-              <a:rPr lang="en-US" sz="4500" dirty="0"/>
-              <a:t/>
-            </a:r>
             <a:br>
               <a:rPr lang="en-US" sz="4500" dirty="0"/>
             </a:br>
-            <a:r>
-              <a:rPr lang="en-US" sz="4500" dirty="0"/>
-              <a:t/>
-            </a:r>
             <a:br>
               <a:rPr lang="en-US" sz="4500" dirty="0"/>
             </a:br>
@@ -4572,10 +4552,9 @@
           <a:lstStyle/>
           <a:p>
             <a:r>
-              <a:rPr lang="en-US" smtClean="0"/>
+              <a:rPr lang="en-US"/>
               <a:t>9/5/2019</a:t>
             </a:r>
-            <a:endParaRPr lang="en-US"/>
           </a:p>
         </p:txBody>
       </p:sp>
@@ -4676,13 +4655,8 @@
             </a:r>
             <a:r>
               <a:rPr lang="en-GB" dirty="0"/>
-              <a:t>: </a:t>
-            </a:r>
-            <a:r>
-              <a:rPr lang="en-GB" dirty="0" smtClean="0"/>
-              <a:t>0.6 </a:t>
-            </a:r>
-            <a:endParaRPr lang="en-GB" dirty="0"/>
+              <a:t>: 0.6 </a:t>
+            </a:r>
           </a:p>
           <a:p>
             <a:r>
@@ -4882,10 +4856,9 @@
           <a:lstStyle/>
           <a:p>
             <a:r>
-              <a:rPr lang="en-US" smtClean="0"/>
+              <a:rPr lang="en-US"/>
               <a:t>9/5/2019</a:t>
             </a:r>
-            <a:endParaRPr lang="en-US"/>
           </a:p>
         </p:txBody>
       </p:sp>
@@ -5187,10 +5160,9 @@
           <a:lstStyle/>
           <a:p>
             <a:r>
-              <a:rPr lang="en-US" smtClean="0"/>
+              <a:rPr lang="en-US"/>
               <a:t>9/5/2019</a:t>
             </a:r>
-            <a:endParaRPr lang="en-US"/>
           </a:p>
         </p:txBody>
       </p:sp>
@@ -5492,10 +5464,9 @@
           <a:lstStyle/>
           <a:p>
             <a:r>
-              <a:rPr lang="en-US" smtClean="0"/>
+              <a:rPr lang="en-US"/>
               <a:t>9/5/2019</a:t>
             </a:r>
-            <a:endParaRPr lang="en-US"/>
           </a:p>
         </p:txBody>
       </p:sp>
@@ -5596,13 +5567,8 @@
             </a:r>
             <a:r>
               <a:rPr lang="en-GB" dirty="0"/>
-              <a:t>: </a:t>
-            </a:r>
-            <a:r>
-              <a:rPr lang="en-GB" dirty="0" smtClean="0"/>
-              <a:t>0.0 </a:t>
-            </a:r>
-            <a:endParaRPr lang="en-GB" dirty="0"/>
+              <a:t>: 0.0 </a:t>
+            </a:r>
           </a:p>
           <a:p>
             <a:r>
@@ -5696,6 +5662,66 @@
           </a:p>
         </p:txBody>
       </p:sp>
+      <p:pic>
+        <p:nvPicPr>
+          <p:cNvPr id="6" name="Picture 5">
+            <a:extLst>
+              <a:ext uri="{FF2B5EF4-FFF2-40B4-BE49-F238E27FC236}">
+                <a16:creationId xmlns:a16="http://schemas.microsoft.com/office/drawing/2014/main" id="{500C32B0-487C-B949-A06A-BDC2F4C6A4F1}"/>
+              </a:ext>
+            </a:extLst>
+          </p:cNvPr>
+          <p:cNvPicPr>
+            <a:picLocks noChangeAspect="1"/>
+          </p:cNvPicPr>
+          <p:nvPr/>
+        </p:nvPicPr>
+        <p:blipFill>
+          <a:blip r:embed="rId2"/>
+          <a:stretch>
+            <a:fillRect/>
+          </a:stretch>
+        </p:blipFill>
+        <p:spPr>
+          <a:xfrm>
+            <a:off x="914630" y="-33090"/>
+            <a:ext cx="4378476" cy="6858000"/>
+          </a:xfrm>
+          <a:prstGeom prst="rect">
+            <a:avLst/>
+          </a:prstGeom>
+        </p:spPr>
+      </p:pic>
+      <p:pic>
+        <p:nvPicPr>
+          <p:cNvPr id="12" name="Picture 11">
+            <a:extLst>
+              <a:ext uri="{FF2B5EF4-FFF2-40B4-BE49-F238E27FC236}">
+                <a16:creationId xmlns:a16="http://schemas.microsoft.com/office/drawing/2014/main" id="{51BAF088-393C-0B4C-9FB5-FD61B89A4956}"/>
+              </a:ext>
+            </a:extLst>
+          </p:cNvPr>
+          <p:cNvPicPr>
+            <a:picLocks noChangeAspect="1"/>
+          </p:cNvPicPr>
+          <p:nvPr/>
+        </p:nvPicPr>
+        <p:blipFill>
+          <a:blip r:embed="rId3"/>
+          <a:stretch>
+            <a:fillRect/>
+          </a:stretch>
+        </p:blipFill>
+        <p:spPr>
+          <a:xfrm>
+            <a:off x="3906762" y="0"/>
+            <a:ext cx="4378476" cy="6858000"/>
+          </a:xfrm>
+          <a:prstGeom prst="rect">
+            <a:avLst/>
+          </a:prstGeom>
+        </p:spPr>
+      </p:pic>
     </p:spTree>
     <p:extLst>
       <p:ext uri="{BB962C8B-B14F-4D97-AF65-F5344CB8AC3E}">
@@ -5742,10 +5768,9 @@
           <a:lstStyle/>
           <a:p>
             <a:r>
-              <a:rPr lang="en-US" smtClean="0"/>
+              <a:rPr lang="en-US"/>
               <a:t>9/5/2019</a:t>
             </a:r>
-            <a:endParaRPr lang="en-US"/>
           </a:p>
         </p:txBody>
       </p:sp>
@@ -5846,13 +5871,8 @@
             </a:r>
             <a:r>
               <a:rPr lang="en-GB" dirty="0"/>
-              <a:t>: </a:t>
-            </a:r>
-            <a:r>
-              <a:rPr lang="en-GB" dirty="0" smtClean="0"/>
-              <a:t>0.1</a:t>
-            </a:r>
-            <a:endParaRPr lang="en-GB" dirty="0"/>
+              <a:t>: 0.1</a:t>
+            </a:r>
           </a:p>
           <a:p>
             <a:r>
@@ -5946,6 +5966,66 @@
           </a:p>
         </p:txBody>
       </p:sp>
+      <p:pic>
+        <p:nvPicPr>
+          <p:cNvPr id="6" name="Picture 5">
+            <a:extLst>
+              <a:ext uri="{FF2B5EF4-FFF2-40B4-BE49-F238E27FC236}">
+                <a16:creationId xmlns:a16="http://schemas.microsoft.com/office/drawing/2014/main" id="{8276FC04-6F35-A24D-99BF-3FA478D0B7A2}"/>
+              </a:ext>
+            </a:extLst>
+          </p:cNvPr>
+          <p:cNvPicPr>
+            <a:picLocks noChangeAspect="1"/>
+          </p:cNvPicPr>
+          <p:nvPr/>
+        </p:nvPicPr>
+        <p:blipFill>
+          <a:blip r:embed="rId2"/>
+          <a:stretch>
+            <a:fillRect/>
+          </a:stretch>
+        </p:blipFill>
+        <p:spPr>
+          <a:xfrm>
+            <a:off x="1911329" y="0"/>
+            <a:ext cx="4378476" cy="6858000"/>
+          </a:xfrm>
+          <a:prstGeom prst="rect">
+            <a:avLst/>
+          </a:prstGeom>
+        </p:spPr>
+      </p:pic>
+      <p:pic>
+        <p:nvPicPr>
+          <p:cNvPr id="12" name="Picture 11">
+            <a:extLst>
+              <a:ext uri="{FF2B5EF4-FFF2-40B4-BE49-F238E27FC236}">
+                <a16:creationId xmlns:a16="http://schemas.microsoft.com/office/drawing/2014/main" id="{FDCA24FC-D6BD-254A-B87A-2003F25ABF8E}"/>
+              </a:ext>
+            </a:extLst>
+          </p:cNvPr>
+          <p:cNvPicPr>
+            <a:picLocks noChangeAspect="1"/>
+          </p:cNvPicPr>
+          <p:nvPr/>
+        </p:nvPicPr>
+        <p:blipFill>
+          <a:blip r:embed="rId3"/>
+          <a:stretch>
+            <a:fillRect/>
+          </a:stretch>
+        </p:blipFill>
+        <p:spPr>
+          <a:xfrm>
+            <a:off x="3906762" y="0"/>
+            <a:ext cx="4378476" cy="6858000"/>
+          </a:xfrm>
+          <a:prstGeom prst="rect">
+            <a:avLst/>
+          </a:prstGeom>
+        </p:spPr>
+      </p:pic>
     </p:spTree>
     <p:extLst>
       <p:ext uri="{BB962C8B-B14F-4D97-AF65-F5344CB8AC3E}">
@@ -5992,10 +6072,9 @@
           <a:lstStyle/>
           <a:p>
             <a:r>
-              <a:rPr lang="en-US" smtClean="0"/>
+              <a:rPr lang="en-US"/>
               <a:t>9/5/2019</a:t>
             </a:r>
-            <a:endParaRPr lang="en-US"/>
           </a:p>
         </p:txBody>
       </p:sp>
@@ -6096,13 +6175,8 @@
             </a:r>
             <a:r>
               <a:rPr lang="en-GB" dirty="0"/>
-              <a:t>: </a:t>
-            </a:r>
-            <a:r>
-              <a:rPr lang="en-GB" dirty="0" smtClean="0"/>
-              <a:t>0.2 </a:t>
-            </a:r>
-            <a:endParaRPr lang="en-GB" dirty="0"/>
+              <a:t>: 0.2 </a:t>
+            </a:r>
           </a:p>
           <a:p>
             <a:r>
@@ -6196,6 +6270,66 @@
           </a:p>
         </p:txBody>
       </p:sp>
+      <p:pic>
+        <p:nvPicPr>
+          <p:cNvPr id="6" name="Picture 5">
+            <a:extLst>
+              <a:ext uri="{FF2B5EF4-FFF2-40B4-BE49-F238E27FC236}">
+                <a16:creationId xmlns:a16="http://schemas.microsoft.com/office/drawing/2014/main" id="{375C6DD5-AD84-0948-B2C9-926B1997B6EC}"/>
+              </a:ext>
+            </a:extLst>
+          </p:cNvPr>
+          <p:cNvPicPr>
+            <a:picLocks noChangeAspect="1"/>
+          </p:cNvPicPr>
+          <p:nvPr/>
+        </p:nvPicPr>
+        <p:blipFill>
+          <a:blip r:embed="rId2"/>
+          <a:stretch>
+            <a:fillRect/>
+          </a:stretch>
+        </p:blipFill>
+        <p:spPr>
+          <a:xfrm>
+            <a:off x="1911329" y="-302849"/>
+            <a:ext cx="4378476" cy="6858000"/>
+          </a:xfrm>
+          <a:prstGeom prst="rect">
+            <a:avLst/>
+          </a:prstGeom>
+        </p:spPr>
+      </p:pic>
+      <p:pic>
+        <p:nvPicPr>
+          <p:cNvPr id="12" name="Picture 11">
+            <a:extLst>
+              <a:ext uri="{FF2B5EF4-FFF2-40B4-BE49-F238E27FC236}">
+                <a16:creationId xmlns:a16="http://schemas.microsoft.com/office/drawing/2014/main" id="{A3F50376-2F22-D942-B0C0-4D1649C8209F}"/>
+              </a:ext>
+            </a:extLst>
+          </p:cNvPr>
+          <p:cNvPicPr>
+            <a:picLocks noChangeAspect="1"/>
+          </p:cNvPicPr>
+          <p:nvPr/>
+        </p:nvPicPr>
+        <p:blipFill>
+          <a:blip r:embed="rId3"/>
+          <a:stretch>
+            <a:fillRect/>
+          </a:stretch>
+        </p:blipFill>
+        <p:spPr>
+          <a:xfrm>
+            <a:off x="3906762" y="0"/>
+            <a:ext cx="4378476" cy="6858000"/>
+          </a:xfrm>
+          <a:prstGeom prst="rect">
+            <a:avLst/>
+          </a:prstGeom>
+        </p:spPr>
+      </p:pic>
     </p:spTree>
     <p:extLst>
       <p:ext uri="{BB962C8B-B14F-4D97-AF65-F5344CB8AC3E}">
@@ -6242,10 +6376,9 @@
           <a:lstStyle/>
           <a:p>
             <a:r>
-              <a:rPr lang="en-US" smtClean="0"/>
+              <a:rPr lang="en-US"/>
               <a:t>9/5/2019</a:t>
             </a:r>
-            <a:endParaRPr lang="en-US"/>
           </a:p>
         </p:txBody>
       </p:sp>
@@ -6346,13 +6479,8 @@
             </a:r>
             <a:r>
               <a:rPr lang="en-GB" dirty="0"/>
-              <a:t>: </a:t>
-            </a:r>
-            <a:r>
-              <a:rPr lang="en-GB" dirty="0" smtClean="0"/>
-              <a:t>0.3</a:t>
-            </a:r>
-            <a:endParaRPr lang="en-GB" dirty="0"/>
+              <a:t>: 0.3</a:t>
+            </a:r>
           </a:p>
           <a:p>
             <a:r>
@@ -6446,6 +6574,66 @@
           </a:p>
         </p:txBody>
       </p:sp>
+      <p:pic>
+        <p:nvPicPr>
+          <p:cNvPr id="6" name="Picture 5">
+            <a:extLst>
+              <a:ext uri="{FF2B5EF4-FFF2-40B4-BE49-F238E27FC236}">
+                <a16:creationId xmlns:a16="http://schemas.microsoft.com/office/drawing/2014/main" id="{6C8F4AD0-C315-FD4E-9AEC-167230015B35}"/>
+              </a:ext>
+            </a:extLst>
+          </p:cNvPr>
+          <p:cNvPicPr>
+            <a:picLocks noChangeAspect="1"/>
+          </p:cNvPicPr>
+          <p:nvPr/>
+        </p:nvPicPr>
+        <p:blipFill>
+          <a:blip r:embed="rId2"/>
+          <a:stretch>
+            <a:fillRect/>
+          </a:stretch>
+        </p:blipFill>
+        <p:spPr>
+          <a:xfrm>
+            <a:off x="1911329" y="-398215"/>
+            <a:ext cx="4378476" cy="6858000"/>
+          </a:xfrm>
+          <a:prstGeom prst="rect">
+            <a:avLst/>
+          </a:prstGeom>
+        </p:spPr>
+      </p:pic>
+      <p:pic>
+        <p:nvPicPr>
+          <p:cNvPr id="12" name="Picture 11">
+            <a:extLst>
+              <a:ext uri="{FF2B5EF4-FFF2-40B4-BE49-F238E27FC236}">
+                <a16:creationId xmlns:a16="http://schemas.microsoft.com/office/drawing/2014/main" id="{D9C5D23B-337A-0547-8C3B-F6F9585A27EC}"/>
+              </a:ext>
+            </a:extLst>
+          </p:cNvPr>
+          <p:cNvPicPr>
+            <a:picLocks noChangeAspect="1"/>
+          </p:cNvPicPr>
+          <p:nvPr/>
+        </p:nvPicPr>
+        <p:blipFill>
+          <a:blip r:embed="rId3"/>
+          <a:stretch>
+            <a:fillRect/>
+          </a:stretch>
+        </p:blipFill>
+        <p:spPr>
+          <a:xfrm>
+            <a:off x="3906762" y="0"/>
+            <a:ext cx="4378476" cy="6858000"/>
+          </a:xfrm>
+          <a:prstGeom prst="rect">
+            <a:avLst/>
+          </a:prstGeom>
+        </p:spPr>
+      </p:pic>
     </p:spTree>
     <p:extLst>
       <p:ext uri="{BB962C8B-B14F-4D97-AF65-F5344CB8AC3E}">
@@ -6492,10 +6680,9 @@
           <a:lstStyle/>
           <a:p>
             <a:r>
-              <a:rPr lang="en-US" smtClean="0"/>
+              <a:rPr lang="en-US"/>
               <a:t>9/5/2019</a:t>
             </a:r>
-            <a:endParaRPr lang="en-US"/>
           </a:p>
         </p:txBody>
       </p:sp>
@@ -6596,13 +6783,8 @@
             </a:r>
             <a:r>
               <a:rPr lang="en-GB" dirty="0"/>
-              <a:t>: </a:t>
-            </a:r>
-            <a:r>
-              <a:rPr lang="en-GB" dirty="0" smtClean="0"/>
-              <a:t>0.4 </a:t>
-            </a:r>
-            <a:endParaRPr lang="en-GB" dirty="0"/>
+              <a:t>: 0.4 </a:t>
+            </a:r>
           </a:p>
           <a:p>
             <a:r>
@@ -6696,6 +6878,66 @@
           </a:p>
         </p:txBody>
       </p:sp>
+      <p:pic>
+        <p:nvPicPr>
+          <p:cNvPr id="6" name="Picture 5">
+            <a:extLst>
+              <a:ext uri="{FF2B5EF4-FFF2-40B4-BE49-F238E27FC236}">
+                <a16:creationId xmlns:a16="http://schemas.microsoft.com/office/drawing/2014/main" id="{7EEA96CF-B9D2-4B4E-9644-EFB16457FCC6}"/>
+              </a:ext>
+            </a:extLst>
+          </p:cNvPr>
+          <p:cNvPicPr>
+            <a:picLocks noChangeAspect="1"/>
+          </p:cNvPicPr>
+          <p:nvPr/>
+        </p:nvPicPr>
+        <p:blipFill>
+          <a:blip r:embed="rId2"/>
+          <a:stretch>
+            <a:fillRect/>
+          </a:stretch>
+        </p:blipFill>
+        <p:spPr>
+          <a:xfrm>
+            <a:off x="2591360" y="148893"/>
+            <a:ext cx="4378476" cy="6858000"/>
+          </a:xfrm>
+          <a:prstGeom prst="rect">
+            <a:avLst/>
+          </a:prstGeom>
+        </p:spPr>
+      </p:pic>
+      <p:pic>
+        <p:nvPicPr>
+          <p:cNvPr id="12" name="Picture 11">
+            <a:extLst>
+              <a:ext uri="{FF2B5EF4-FFF2-40B4-BE49-F238E27FC236}">
+                <a16:creationId xmlns:a16="http://schemas.microsoft.com/office/drawing/2014/main" id="{813655C0-EC65-FB42-A884-1DD9A5C931C7}"/>
+              </a:ext>
+            </a:extLst>
+          </p:cNvPr>
+          <p:cNvPicPr>
+            <a:picLocks noChangeAspect="1"/>
+          </p:cNvPicPr>
+          <p:nvPr/>
+        </p:nvPicPr>
+        <p:blipFill>
+          <a:blip r:embed="rId3"/>
+          <a:stretch>
+            <a:fillRect/>
+          </a:stretch>
+        </p:blipFill>
+        <p:spPr>
+          <a:xfrm>
+            <a:off x="3906762" y="0"/>
+            <a:ext cx="4378476" cy="6858000"/>
+          </a:xfrm>
+          <a:prstGeom prst="rect">
+            <a:avLst/>
+          </a:prstGeom>
+        </p:spPr>
+      </p:pic>
     </p:spTree>
     <p:extLst>
       <p:ext uri="{BB962C8B-B14F-4D97-AF65-F5344CB8AC3E}">
@@ -6742,10 +6984,9 @@
           <a:lstStyle/>
           <a:p>
             <a:r>
-              <a:rPr lang="en-US" smtClean="0"/>
+              <a:rPr lang="en-US"/>
               <a:t>9/5/2019</a:t>
             </a:r>
-            <a:endParaRPr lang="en-US"/>
           </a:p>
         </p:txBody>
       </p:sp>
@@ -7077,10 +7318,9 @@
           <a:lstStyle/>
           <a:p>
             <a:r>
-              <a:rPr lang="en-US" smtClean="0"/>
+              <a:rPr lang="en-US"/>
               <a:t>9/5/2019</a:t>
             </a:r>
-            <a:endParaRPr lang="en-US"/>
           </a:p>
         </p:txBody>
       </p:sp>
@@ -7611,10 +7851,9 @@
           <a:lstStyle/>
           <a:p>
             <a:r>
-              <a:rPr lang="en-US" smtClean="0"/>
+              <a:rPr lang="en-US"/>
               <a:t>9/5/2019</a:t>
             </a:r>
-            <a:endParaRPr lang="en-US"/>
           </a:p>
         </p:txBody>
       </p:sp>
@@ -7901,10 +8140,9 @@
           <a:lstStyle/>
           <a:p>
             <a:r>
-              <a:rPr lang="en-US" smtClean="0"/>
+              <a:rPr lang="en-US"/>
               <a:t>9/5/2019</a:t>
             </a:r>
-            <a:endParaRPr lang="en-US"/>
           </a:p>
         </p:txBody>
       </p:sp>
@@ -8206,10 +8444,9 @@
           <a:lstStyle/>
           <a:p>
             <a:r>
-              <a:rPr lang="en-US" smtClean="0"/>
+              <a:rPr lang="en-US"/>
               <a:t>9/5/2019</a:t>
             </a:r>
-            <a:endParaRPr lang="en-US"/>
           </a:p>
         </p:txBody>
       </p:sp>
@@ -8344,13 +8581,8 @@
             </a:r>
             <a:r>
               <a:rPr lang="en-GB" dirty="0"/>
-              <a:t>: </a:t>
-            </a:r>
-            <a:r>
-              <a:rPr lang="en-GB" dirty="0" smtClean="0"/>
-              <a:t>0.0</a:t>
-            </a:r>
-            <a:endParaRPr lang="en-GB" dirty="0"/>
+              <a:t>: 0.0</a:t>
+            </a:r>
           </a:p>
           <a:p>
             <a:r>
@@ -8444,6 +8676,66 @@
           </a:p>
         </p:txBody>
       </p:sp>
+      <p:pic>
+        <p:nvPicPr>
+          <p:cNvPr id="10" name="Picture 9">
+            <a:extLst>
+              <a:ext uri="{FF2B5EF4-FFF2-40B4-BE49-F238E27FC236}">
+                <a16:creationId xmlns:a16="http://schemas.microsoft.com/office/drawing/2014/main" id="{F0D674D1-F7CD-C747-ACDA-B454E66A420D}"/>
+              </a:ext>
+            </a:extLst>
+          </p:cNvPr>
+          <p:cNvPicPr>
+            <a:picLocks noChangeAspect="1"/>
+          </p:cNvPicPr>
+          <p:nvPr/>
+        </p:nvPicPr>
+        <p:blipFill>
+          <a:blip r:embed="rId2"/>
+          <a:stretch>
+            <a:fillRect/>
+          </a:stretch>
+        </p:blipFill>
+        <p:spPr>
+          <a:xfrm>
+            <a:off x="3906762" y="0"/>
+            <a:ext cx="4378476" cy="6858000"/>
+          </a:xfrm>
+          <a:prstGeom prst="rect">
+            <a:avLst/>
+          </a:prstGeom>
+        </p:spPr>
+      </p:pic>
+      <p:pic>
+        <p:nvPicPr>
+          <p:cNvPr id="13" name="Picture 12">
+            <a:extLst>
+              <a:ext uri="{FF2B5EF4-FFF2-40B4-BE49-F238E27FC236}">
+                <a16:creationId xmlns:a16="http://schemas.microsoft.com/office/drawing/2014/main" id="{AC154D6F-181A-AB4F-9EFD-5FC5FE4F416B}"/>
+              </a:ext>
+            </a:extLst>
+          </p:cNvPr>
+          <p:cNvPicPr>
+            <a:picLocks noChangeAspect="1"/>
+          </p:cNvPicPr>
+          <p:nvPr/>
+        </p:nvPicPr>
+        <p:blipFill>
+          <a:blip r:embed="rId3"/>
+          <a:stretch>
+            <a:fillRect/>
+          </a:stretch>
+        </p:blipFill>
+        <p:spPr>
+          <a:xfrm>
+            <a:off x="1717524" y="-148893"/>
+            <a:ext cx="4378476" cy="6858000"/>
+          </a:xfrm>
+          <a:prstGeom prst="rect">
+            <a:avLst/>
+          </a:prstGeom>
+        </p:spPr>
+      </p:pic>
     </p:spTree>
     <p:extLst>
       <p:ext uri="{BB962C8B-B14F-4D97-AF65-F5344CB8AC3E}">
@@ -8490,10 +8782,9 @@
           <a:lstStyle/>
           <a:p>
             <a:r>
-              <a:rPr lang="en-US" smtClean="0"/>
+              <a:rPr lang="en-US"/>
               <a:t>9/5/2019</a:t>
             </a:r>
-            <a:endParaRPr lang="en-US"/>
           </a:p>
         </p:txBody>
       </p:sp>
@@ -8628,13 +8919,8 @@
             </a:r>
             <a:r>
               <a:rPr lang="en-GB" dirty="0"/>
-              <a:t>: </a:t>
-            </a:r>
-            <a:r>
-              <a:rPr lang="en-GB" dirty="0" smtClean="0"/>
-              <a:t>0.1</a:t>
-            </a:r>
-            <a:endParaRPr lang="en-GB" dirty="0"/>
+              <a:t>: 0.1</a:t>
+            </a:r>
           </a:p>
           <a:p>
             <a:r>
@@ -8728,6 +9014,66 @@
           </a:p>
         </p:txBody>
       </p:sp>
+      <p:pic>
+        <p:nvPicPr>
+          <p:cNvPr id="7" name="Picture 6">
+            <a:extLst>
+              <a:ext uri="{FF2B5EF4-FFF2-40B4-BE49-F238E27FC236}">
+                <a16:creationId xmlns:a16="http://schemas.microsoft.com/office/drawing/2014/main" id="{4471DE96-B52B-F54D-8DD8-3CFFD0291E39}"/>
+              </a:ext>
+            </a:extLst>
+          </p:cNvPr>
+          <p:cNvPicPr>
+            <a:picLocks noChangeAspect="1"/>
+          </p:cNvPicPr>
+          <p:nvPr/>
+        </p:nvPicPr>
+        <p:blipFill>
+          <a:blip r:embed="rId2"/>
+          <a:stretch>
+            <a:fillRect/>
+          </a:stretch>
+        </p:blipFill>
+        <p:spPr>
+          <a:xfrm>
+            <a:off x="3906762" y="0"/>
+            <a:ext cx="4378476" cy="6858000"/>
+          </a:xfrm>
+          <a:prstGeom prst="rect">
+            <a:avLst/>
+          </a:prstGeom>
+        </p:spPr>
+      </p:pic>
+      <p:pic>
+        <p:nvPicPr>
+          <p:cNvPr id="12" name="Picture 11">
+            <a:extLst>
+              <a:ext uri="{FF2B5EF4-FFF2-40B4-BE49-F238E27FC236}">
+                <a16:creationId xmlns:a16="http://schemas.microsoft.com/office/drawing/2014/main" id="{21010601-0954-E84A-AA4D-9F2D6E26EC22}"/>
+              </a:ext>
+            </a:extLst>
+          </p:cNvPr>
+          <p:cNvPicPr>
+            <a:picLocks noChangeAspect="1"/>
+          </p:cNvPicPr>
+          <p:nvPr/>
+        </p:nvPicPr>
+        <p:blipFill>
+          <a:blip r:embed="rId3"/>
+          <a:stretch>
+            <a:fillRect/>
+          </a:stretch>
+        </p:blipFill>
+        <p:spPr>
+          <a:xfrm>
+            <a:off x="2122255" y="0"/>
+            <a:ext cx="4378476" cy="6858000"/>
+          </a:xfrm>
+          <a:prstGeom prst="rect">
+            <a:avLst/>
+          </a:prstGeom>
+        </p:spPr>
+      </p:pic>
     </p:spTree>
     <p:extLst>
       <p:ext uri="{BB962C8B-B14F-4D97-AF65-F5344CB8AC3E}">
@@ -8774,10 +9120,9 @@
           <a:lstStyle/>
           <a:p>
             <a:r>
-              <a:rPr lang="en-US" smtClean="0"/>
+              <a:rPr lang="en-US"/>
               <a:t>9/5/2019</a:t>
             </a:r>
-            <a:endParaRPr lang="en-US"/>
           </a:p>
         </p:txBody>
       </p:sp>
@@ -8912,13 +9257,8 @@
             </a:r>
             <a:r>
               <a:rPr lang="en-GB" dirty="0"/>
-              <a:t>: </a:t>
-            </a:r>
-            <a:r>
-              <a:rPr lang="en-GB" dirty="0" smtClean="0"/>
-              <a:t>0.2</a:t>
-            </a:r>
-            <a:endParaRPr lang="en-GB" dirty="0"/>
+              <a:t>: 0.2</a:t>
+            </a:r>
           </a:p>
           <a:p>
             <a:r>
@@ -9012,6 +9352,66 @@
           </a:p>
         </p:txBody>
       </p:sp>
+      <p:pic>
+        <p:nvPicPr>
+          <p:cNvPr id="7" name="Picture 6">
+            <a:extLst>
+              <a:ext uri="{FF2B5EF4-FFF2-40B4-BE49-F238E27FC236}">
+                <a16:creationId xmlns:a16="http://schemas.microsoft.com/office/drawing/2014/main" id="{BE0FBBB1-E806-AE4F-85E7-53F9214541B6}"/>
+              </a:ext>
+            </a:extLst>
+          </p:cNvPr>
+          <p:cNvPicPr>
+            <a:picLocks noChangeAspect="1"/>
+          </p:cNvPicPr>
+          <p:nvPr/>
+        </p:nvPicPr>
+        <p:blipFill>
+          <a:blip r:embed="rId2"/>
+          <a:stretch>
+            <a:fillRect/>
+          </a:stretch>
+        </p:blipFill>
+        <p:spPr>
+          <a:xfrm>
+            <a:off x="3906762" y="0"/>
+            <a:ext cx="4378476" cy="6858000"/>
+          </a:xfrm>
+          <a:prstGeom prst="rect">
+            <a:avLst/>
+          </a:prstGeom>
+        </p:spPr>
+      </p:pic>
+      <p:pic>
+        <p:nvPicPr>
+          <p:cNvPr id="12" name="Picture 11">
+            <a:extLst>
+              <a:ext uri="{FF2B5EF4-FFF2-40B4-BE49-F238E27FC236}">
+                <a16:creationId xmlns:a16="http://schemas.microsoft.com/office/drawing/2014/main" id="{59FA65FB-EE34-DD4C-83BC-E571E19734A5}"/>
+              </a:ext>
+            </a:extLst>
+          </p:cNvPr>
+          <p:cNvPicPr>
+            <a:picLocks noChangeAspect="1"/>
+          </p:cNvPicPr>
+          <p:nvPr/>
+        </p:nvPicPr>
+        <p:blipFill>
+          <a:blip r:embed="rId3"/>
+          <a:stretch>
+            <a:fillRect/>
+          </a:stretch>
+        </p:blipFill>
+        <p:spPr>
+          <a:xfrm>
+            <a:off x="2045316" y="-33090"/>
+            <a:ext cx="4378476" cy="6858000"/>
+          </a:xfrm>
+          <a:prstGeom prst="rect">
+            <a:avLst/>
+          </a:prstGeom>
+        </p:spPr>
+      </p:pic>
     </p:spTree>
     <p:extLst>
       <p:ext uri="{BB962C8B-B14F-4D97-AF65-F5344CB8AC3E}">
@@ -9058,10 +9458,9 @@
           <a:lstStyle/>
           <a:p>
             <a:r>
-              <a:rPr lang="en-US" smtClean="0"/>
+              <a:rPr lang="en-US"/>
               <a:t>9/5/2019</a:t>
             </a:r>
-            <a:endParaRPr lang="en-US"/>
           </a:p>
         </p:txBody>
       </p:sp>
@@ -9196,13 +9595,8 @@
             </a:r>
             <a:r>
               <a:rPr lang="en-GB" dirty="0"/>
-              <a:t>: </a:t>
-            </a:r>
-            <a:r>
-              <a:rPr lang="en-GB" dirty="0" smtClean="0"/>
-              <a:t>0.3</a:t>
-            </a:r>
-            <a:endParaRPr lang="en-GB" dirty="0"/>
+              <a:t>: 0.3</a:t>
+            </a:r>
           </a:p>
           <a:p>
             <a:r>
@@ -9296,6 +9690,66 @@
           </a:p>
         </p:txBody>
       </p:sp>
+      <p:pic>
+        <p:nvPicPr>
+          <p:cNvPr id="7" name="Picture 6">
+            <a:extLst>
+              <a:ext uri="{FF2B5EF4-FFF2-40B4-BE49-F238E27FC236}">
+                <a16:creationId xmlns:a16="http://schemas.microsoft.com/office/drawing/2014/main" id="{7B3CA76E-56F6-2841-AE99-79A503A2EC71}"/>
+              </a:ext>
+            </a:extLst>
+          </p:cNvPr>
+          <p:cNvPicPr>
+            <a:picLocks noChangeAspect="1"/>
+          </p:cNvPicPr>
+          <p:nvPr/>
+        </p:nvPicPr>
+        <p:blipFill>
+          <a:blip r:embed="rId2"/>
+          <a:stretch>
+            <a:fillRect/>
+          </a:stretch>
+        </p:blipFill>
+        <p:spPr>
+          <a:xfrm>
+            <a:off x="3906762" y="0"/>
+            <a:ext cx="4378476" cy="6858000"/>
+          </a:xfrm>
+          <a:prstGeom prst="rect">
+            <a:avLst/>
+          </a:prstGeom>
+        </p:spPr>
+      </p:pic>
+      <p:pic>
+        <p:nvPicPr>
+          <p:cNvPr id="12" name="Picture 11">
+            <a:extLst>
+              <a:ext uri="{FF2B5EF4-FFF2-40B4-BE49-F238E27FC236}">
+                <a16:creationId xmlns:a16="http://schemas.microsoft.com/office/drawing/2014/main" id="{309C278B-4325-4248-9BAA-88DF2A3E1A1A}"/>
+              </a:ext>
+            </a:extLst>
+          </p:cNvPr>
+          <p:cNvPicPr>
+            <a:picLocks noChangeAspect="1"/>
+          </p:cNvPicPr>
+          <p:nvPr/>
+        </p:nvPicPr>
+        <p:blipFill>
+          <a:blip r:embed="rId3"/>
+          <a:stretch>
+            <a:fillRect/>
+          </a:stretch>
+        </p:blipFill>
+        <p:spPr>
+          <a:xfrm>
+            <a:off x="1928682" y="-302849"/>
+            <a:ext cx="4378476" cy="6858000"/>
+          </a:xfrm>
+          <a:prstGeom prst="rect">
+            <a:avLst/>
+          </a:prstGeom>
+        </p:spPr>
+      </p:pic>
     </p:spTree>
     <p:extLst>
       <p:ext uri="{BB962C8B-B14F-4D97-AF65-F5344CB8AC3E}">
@@ -9342,10 +9796,9 @@
           <a:lstStyle/>
           <a:p>
             <a:r>
-              <a:rPr lang="en-US" smtClean="0"/>
+              <a:rPr lang="en-US"/>
               <a:t>9/5/2019</a:t>
             </a:r>
-            <a:endParaRPr lang="en-US"/>
           </a:p>
         </p:txBody>
       </p:sp>
@@ -9480,13 +9933,8 @@
             </a:r>
             <a:r>
               <a:rPr lang="en-GB" dirty="0"/>
-              <a:t>: </a:t>
-            </a:r>
-            <a:r>
-              <a:rPr lang="en-GB" dirty="0" smtClean="0"/>
-              <a:t>0.4</a:t>
-            </a:r>
-            <a:endParaRPr lang="en-GB" dirty="0"/>
+              <a:t>: 0.4</a:t>
+            </a:r>
           </a:p>
           <a:p>
             <a:r>
@@ -9580,6 +10028,66 @@
           </a:p>
         </p:txBody>
       </p:sp>
+      <p:pic>
+        <p:nvPicPr>
+          <p:cNvPr id="7" name="Picture 6">
+            <a:extLst>
+              <a:ext uri="{FF2B5EF4-FFF2-40B4-BE49-F238E27FC236}">
+                <a16:creationId xmlns:a16="http://schemas.microsoft.com/office/drawing/2014/main" id="{ADF59781-46E0-F94D-9EFA-DDDAC102B33C}"/>
+              </a:ext>
+            </a:extLst>
+          </p:cNvPr>
+          <p:cNvPicPr>
+            <a:picLocks noChangeAspect="1"/>
+          </p:cNvPicPr>
+          <p:nvPr/>
+        </p:nvPicPr>
+        <p:blipFill>
+          <a:blip r:embed="rId2"/>
+          <a:stretch>
+            <a:fillRect/>
+          </a:stretch>
+        </p:blipFill>
+        <p:spPr>
+          <a:xfrm>
+            <a:off x="3906762" y="0"/>
+            <a:ext cx="4378476" cy="6858000"/>
+          </a:xfrm>
+          <a:prstGeom prst="rect">
+            <a:avLst/>
+          </a:prstGeom>
+        </p:spPr>
+      </p:pic>
+      <p:pic>
+        <p:nvPicPr>
+          <p:cNvPr id="12" name="Picture 11">
+            <a:extLst>
+              <a:ext uri="{FF2B5EF4-FFF2-40B4-BE49-F238E27FC236}">
+                <a16:creationId xmlns:a16="http://schemas.microsoft.com/office/drawing/2014/main" id="{6B617CB0-705B-9642-9BC1-7CD018F5E868}"/>
+              </a:ext>
+            </a:extLst>
+          </p:cNvPr>
+          <p:cNvPicPr>
+            <a:picLocks noChangeAspect="1"/>
+          </p:cNvPicPr>
+          <p:nvPr/>
+        </p:nvPicPr>
+        <p:blipFill>
+          <a:blip r:embed="rId3"/>
+          <a:stretch>
+            <a:fillRect/>
+          </a:stretch>
+        </p:blipFill>
+        <p:spPr>
+          <a:xfrm>
+            <a:off x="1911329" y="-33090"/>
+            <a:ext cx="4378476" cy="6858000"/>
+          </a:xfrm>
+          <a:prstGeom prst="rect">
+            <a:avLst/>
+          </a:prstGeom>
+        </p:spPr>
+      </p:pic>
     </p:spTree>
     <p:extLst>
       <p:ext uri="{BB962C8B-B14F-4D97-AF65-F5344CB8AC3E}">
@@ -9626,10 +10134,9 @@
           <a:lstStyle/>
           <a:p>
             <a:r>
-              <a:rPr lang="en-US" smtClean="0"/>
+              <a:rPr lang="en-US"/>
               <a:t>9/5/2019</a:t>
             </a:r>
-            <a:endParaRPr lang="en-US"/>
           </a:p>
         </p:txBody>
       </p:sp>
@@ -9965,10 +10472,9 @@
           <a:lstStyle/>
           <a:p>
             <a:r>
-              <a:rPr lang="en-US" smtClean="0"/>
+              <a:rPr lang="en-US"/>
               <a:t>9/5/2019</a:t>
             </a:r>
-            <a:endParaRPr lang="en-US"/>
           </a:p>
         </p:txBody>
       </p:sp>
@@ -10334,10 +10840,9 @@
           <a:lstStyle/>
           <a:p>
             <a:r>
-              <a:rPr lang="en-US" smtClean="0"/>
+              <a:rPr lang="en-US"/>
               <a:t>9/5/2019</a:t>
             </a:r>
-            <a:endParaRPr lang="en-US"/>
           </a:p>
         </p:txBody>
       </p:sp>
@@ -10673,10 +11178,9 @@
           <a:lstStyle/>
           <a:p>
             <a:r>
-              <a:rPr lang="en-US" smtClean="0"/>
+              <a:rPr lang="en-US"/>
               <a:t>9/5/2019</a:t>
             </a:r>
-            <a:endParaRPr lang="en-US"/>
           </a:p>
         </p:txBody>
       </p:sp>
@@ -10811,13 +11315,8 @@
             </a:r>
             <a:r>
               <a:rPr lang="en-GB" dirty="0"/>
-              <a:t>: </a:t>
-            </a:r>
-            <a:r>
-              <a:rPr lang="en-GB" dirty="0" smtClean="0"/>
-              <a:t>0.0</a:t>
-            </a:r>
-            <a:endParaRPr lang="en-GB" dirty="0"/>
+              <a:t>: 0.0</a:t>
+            </a:r>
           </a:p>
           <a:p>
             <a:r>
@@ -10911,6 +11410,66 @@
           </a:p>
         </p:txBody>
       </p:sp>
+      <p:pic>
+        <p:nvPicPr>
+          <p:cNvPr id="6" name="Picture 5">
+            <a:extLst>
+              <a:ext uri="{FF2B5EF4-FFF2-40B4-BE49-F238E27FC236}">
+                <a16:creationId xmlns:a16="http://schemas.microsoft.com/office/drawing/2014/main" id="{32051D9F-2CC6-F542-8919-028EA9A02069}"/>
+              </a:ext>
+            </a:extLst>
+          </p:cNvPr>
+          <p:cNvPicPr>
+            <a:picLocks noChangeAspect="1"/>
+          </p:cNvPicPr>
+          <p:nvPr/>
+        </p:nvPicPr>
+        <p:blipFill>
+          <a:blip r:embed="rId2"/>
+          <a:stretch>
+            <a:fillRect/>
+          </a:stretch>
+        </p:blipFill>
+        <p:spPr>
+          <a:xfrm>
+            <a:off x="3906762" y="0"/>
+            <a:ext cx="4378476" cy="6858000"/>
+          </a:xfrm>
+          <a:prstGeom prst="rect">
+            <a:avLst/>
+          </a:prstGeom>
+        </p:spPr>
+      </p:pic>
+      <p:pic>
+        <p:nvPicPr>
+          <p:cNvPr id="12" name="Picture 11">
+            <a:extLst>
+              <a:ext uri="{FF2B5EF4-FFF2-40B4-BE49-F238E27FC236}">
+                <a16:creationId xmlns:a16="http://schemas.microsoft.com/office/drawing/2014/main" id="{78ECBF45-E1BD-6346-B95E-4027C6F639A3}"/>
+              </a:ext>
+            </a:extLst>
+          </p:cNvPr>
+          <p:cNvPicPr>
+            <a:picLocks noChangeAspect="1"/>
+          </p:cNvPicPr>
+          <p:nvPr/>
+        </p:nvPicPr>
+        <p:blipFill>
+          <a:blip r:embed="rId3"/>
+          <a:stretch>
+            <a:fillRect/>
+          </a:stretch>
+        </p:blipFill>
+        <p:spPr>
+          <a:xfrm>
+            <a:off x="1986999" y="-302849"/>
+            <a:ext cx="4378476" cy="6858000"/>
+          </a:xfrm>
+          <a:prstGeom prst="rect">
+            <a:avLst/>
+          </a:prstGeom>
+        </p:spPr>
+      </p:pic>
     </p:spTree>
     <p:extLst>
       <p:ext uri="{BB962C8B-B14F-4D97-AF65-F5344CB8AC3E}">
@@ -10985,10 +11544,9 @@
           <a:lstStyle/>
           <a:p>
             <a:r>
-              <a:rPr lang="en-US" smtClean="0"/>
+              <a:rPr lang="en-US"/>
               <a:t>9/5/2019</a:t>
             </a:r>
-            <a:endParaRPr lang="en-US"/>
           </a:p>
         </p:txBody>
       </p:sp>
@@ -11144,10 +11702,9 @@
           <a:lstStyle/>
           <a:p>
             <a:r>
-              <a:rPr lang="en-US" smtClean="0"/>
+              <a:rPr lang="en-US"/>
               <a:t>9/5/2019</a:t>
             </a:r>
-            <a:endParaRPr lang="en-US"/>
           </a:p>
         </p:txBody>
       </p:sp>
@@ -11282,13 +11839,8 @@
             </a:r>
             <a:r>
               <a:rPr lang="en-GB" dirty="0"/>
-              <a:t>: </a:t>
-            </a:r>
-            <a:r>
-              <a:rPr lang="en-GB" dirty="0" smtClean="0"/>
-              <a:t>0.1</a:t>
-            </a:r>
-            <a:endParaRPr lang="en-GB" dirty="0"/>
+              <a:t>: 0.1</a:t>
+            </a:r>
           </a:p>
           <a:p>
             <a:r>
@@ -11382,6 +11934,66 @@
           </a:p>
         </p:txBody>
       </p:sp>
+      <p:pic>
+        <p:nvPicPr>
+          <p:cNvPr id="6" name="Picture 5">
+            <a:extLst>
+              <a:ext uri="{FF2B5EF4-FFF2-40B4-BE49-F238E27FC236}">
+                <a16:creationId xmlns:a16="http://schemas.microsoft.com/office/drawing/2014/main" id="{721CAED7-241F-C04C-B440-36699067B997}"/>
+              </a:ext>
+            </a:extLst>
+          </p:cNvPr>
+          <p:cNvPicPr>
+            <a:picLocks noChangeAspect="1"/>
+          </p:cNvPicPr>
+          <p:nvPr/>
+        </p:nvPicPr>
+        <p:blipFill>
+          <a:blip r:embed="rId2"/>
+          <a:stretch>
+            <a:fillRect/>
+          </a:stretch>
+        </p:blipFill>
+        <p:spPr>
+          <a:xfrm>
+            <a:off x="3906762" y="0"/>
+            <a:ext cx="4378476" cy="6858000"/>
+          </a:xfrm>
+          <a:prstGeom prst="rect">
+            <a:avLst/>
+          </a:prstGeom>
+        </p:spPr>
+      </p:pic>
+      <p:pic>
+        <p:nvPicPr>
+          <p:cNvPr id="12" name="Picture 11">
+            <a:extLst>
+              <a:ext uri="{FF2B5EF4-FFF2-40B4-BE49-F238E27FC236}">
+                <a16:creationId xmlns:a16="http://schemas.microsoft.com/office/drawing/2014/main" id="{5E804D8B-6E81-7C4C-ABBD-2E47D14ABE72}"/>
+              </a:ext>
+            </a:extLst>
+          </p:cNvPr>
+          <p:cNvPicPr>
+            <a:picLocks noChangeAspect="1"/>
+          </p:cNvPicPr>
+          <p:nvPr/>
+        </p:nvPicPr>
+        <p:blipFill>
+          <a:blip r:embed="rId3"/>
+          <a:stretch>
+            <a:fillRect/>
+          </a:stretch>
+        </p:blipFill>
+        <p:spPr>
+          <a:xfrm>
+            <a:off x="1037369" y="-215653"/>
+            <a:ext cx="4378476" cy="6858000"/>
+          </a:xfrm>
+          <a:prstGeom prst="rect">
+            <a:avLst/>
+          </a:prstGeom>
+        </p:spPr>
+      </p:pic>
     </p:spTree>
     <p:extLst>
       <p:ext uri="{BB962C8B-B14F-4D97-AF65-F5344CB8AC3E}">
@@ -11428,10 +12040,9 @@
           <a:lstStyle/>
           <a:p>
             <a:r>
-              <a:rPr lang="en-US" smtClean="0"/>
+              <a:rPr lang="en-US"/>
               <a:t>9/5/2019</a:t>
             </a:r>
-            <a:endParaRPr lang="en-US"/>
           </a:p>
         </p:txBody>
       </p:sp>
@@ -11566,13 +12177,8 @@
             </a:r>
             <a:r>
               <a:rPr lang="en-GB" dirty="0"/>
-              <a:t>: </a:t>
-            </a:r>
-            <a:r>
-              <a:rPr lang="en-GB" dirty="0" smtClean="0"/>
-              <a:t>0.2</a:t>
-            </a:r>
-            <a:endParaRPr lang="en-GB" dirty="0"/>
+              <a:t>: 0.2</a:t>
+            </a:r>
           </a:p>
           <a:p>
             <a:r>
@@ -11666,6 +12272,66 @@
           </a:p>
         </p:txBody>
       </p:sp>
+      <p:pic>
+        <p:nvPicPr>
+          <p:cNvPr id="6" name="Picture 5">
+            <a:extLst>
+              <a:ext uri="{FF2B5EF4-FFF2-40B4-BE49-F238E27FC236}">
+                <a16:creationId xmlns:a16="http://schemas.microsoft.com/office/drawing/2014/main" id="{F10C761A-947E-7A4F-919C-230E6D90B04A}"/>
+              </a:ext>
+            </a:extLst>
+          </p:cNvPr>
+          <p:cNvPicPr>
+            <a:picLocks noChangeAspect="1"/>
+          </p:cNvPicPr>
+          <p:nvPr/>
+        </p:nvPicPr>
+        <p:blipFill>
+          <a:blip r:embed="rId2"/>
+          <a:stretch>
+            <a:fillRect/>
+          </a:stretch>
+        </p:blipFill>
+        <p:spPr>
+          <a:xfrm>
+            <a:off x="3906762" y="0"/>
+            <a:ext cx="4378476" cy="6858000"/>
+          </a:xfrm>
+          <a:prstGeom prst="rect">
+            <a:avLst/>
+          </a:prstGeom>
+        </p:spPr>
+      </p:pic>
+      <p:pic>
+        <p:nvPicPr>
+          <p:cNvPr id="12" name="Picture 11">
+            <a:extLst>
+              <a:ext uri="{FF2B5EF4-FFF2-40B4-BE49-F238E27FC236}">
+                <a16:creationId xmlns:a16="http://schemas.microsoft.com/office/drawing/2014/main" id="{01ACD5DC-F39B-A748-8F7E-1B6652B8D4DB}"/>
+              </a:ext>
+            </a:extLst>
+          </p:cNvPr>
+          <p:cNvPicPr>
+            <a:picLocks noChangeAspect="1"/>
+          </p:cNvPicPr>
+          <p:nvPr/>
+        </p:nvPicPr>
+        <p:blipFill>
+          <a:blip r:embed="rId3"/>
+          <a:stretch>
+            <a:fillRect/>
+          </a:stretch>
+        </p:blipFill>
+        <p:spPr>
+          <a:xfrm>
+            <a:off x="2040558" y="-33090"/>
+            <a:ext cx="4378476" cy="6858000"/>
+          </a:xfrm>
+          <a:prstGeom prst="rect">
+            <a:avLst/>
+          </a:prstGeom>
+        </p:spPr>
+      </p:pic>
     </p:spTree>
     <p:extLst>
       <p:ext uri="{BB962C8B-B14F-4D97-AF65-F5344CB8AC3E}">
@@ -11712,10 +12378,9 @@
           <a:lstStyle/>
           <a:p>
             <a:r>
-              <a:rPr lang="en-US" smtClean="0"/>
+              <a:rPr lang="en-US"/>
               <a:t>9/5/2019</a:t>
             </a:r>
-            <a:endParaRPr lang="en-US"/>
           </a:p>
         </p:txBody>
       </p:sp>
@@ -11850,13 +12515,8 @@
             </a:r>
             <a:r>
               <a:rPr lang="en-GB" dirty="0"/>
-              <a:t>: </a:t>
-            </a:r>
-            <a:r>
-              <a:rPr lang="en-GB" dirty="0" smtClean="0"/>
-              <a:t>0.3</a:t>
-            </a:r>
-            <a:endParaRPr lang="en-GB" dirty="0"/>
+              <a:t>: 0.3</a:t>
+            </a:r>
           </a:p>
           <a:p>
             <a:r>
@@ -11950,6 +12610,66 @@
           </a:p>
         </p:txBody>
       </p:sp>
+      <p:pic>
+        <p:nvPicPr>
+          <p:cNvPr id="6" name="Picture 5">
+            <a:extLst>
+              <a:ext uri="{FF2B5EF4-FFF2-40B4-BE49-F238E27FC236}">
+                <a16:creationId xmlns:a16="http://schemas.microsoft.com/office/drawing/2014/main" id="{7BC9DEEF-5086-4B41-AEA8-E090432592F8}"/>
+              </a:ext>
+            </a:extLst>
+          </p:cNvPr>
+          <p:cNvPicPr>
+            <a:picLocks noChangeAspect="1"/>
+          </p:cNvPicPr>
+          <p:nvPr/>
+        </p:nvPicPr>
+        <p:blipFill>
+          <a:blip r:embed="rId2"/>
+          <a:stretch>
+            <a:fillRect/>
+          </a:stretch>
+        </p:blipFill>
+        <p:spPr>
+          <a:xfrm>
+            <a:off x="3906762" y="0"/>
+            <a:ext cx="4378476" cy="6858000"/>
+          </a:xfrm>
+          <a:prstGeom prst="rect">
+            <a:avLst/>
+          </a:prstGeom>
+        </p:spPr>
+      </p:pic>
+      <p:pic>
+        <p:nvPicPr>
+          <p:cNvPr id="12" name="Picture 11">
+            <a:extLst>
+              <a:ext uri="{FF2B5EF4-FFF2-40B4-BE49-F238E27FC236}">
+                <a16:creationId xmlns:a16="http://schemas.microsoft.com/office/drawing/2014/main" id="{6E9AC9C0-4099-8742-AC8A-447D3EA43C83}"/>
+              </a:ext>
+            </a:extLst>
+          </p:cNvPr>
+          <p:cNvPicPr>
+            <a:picLocks noChangeAspect="1"/>
+          </p:cNvPicPr>
+          <p:nvPr/>
+        </p:nvPicPr>
+        <p:blipFill>
+          <a:blip r:embed="rId3"/>
+          <a:stretch>
+            <a:fillRect/>
+          </a:stretch>
+        </p:blipFill>
+        <p:spPr>
+          <a:xfrm>
+            <a:off x="2918623" y="33090"/>
+            <a:ext cx="4378476" cy="6858000"/>
+          </a:xfrm>
+          <a:prstGeom prst="rect">
+            <a:avLst/>
+          </a:prstGeom>
+        </p:spPr>
+      </p:pic>
     </p:spTree>
     <p:extLst>
       <p:ext uri="{BB962C8B-B14F-4D97-AF65-F5344CB8AC3E}">
@@ -11996,10 +12716,9 @@
           <a:lstStyle/>
           <a:p>
             <a:r>
-              <a:rPr lang="en-US" smtClean="0"/>
+              <a:rPr lang="en-US"/>
               <a:t>9/5/2019</a:t>
             </a:r>
-            <a:endParaRPr lang="en-US"/>
           </a:p>
         </p:txBody>
       </p:sp>
@@ -12134,13 +12853,8 @@
             </a:r>
             <a:r>
               <a:rPr lang="en-GB" dirty="0"/>
-              <a:t>: </a:t>
-            </a:r>
-            <a:r>
-              <a:rPr lang="en-GB" dirty="0" smtClean="0"/>
-              <a:t>0.4</a:t>
-            </a:r>
-            <a:endParaRPr lang="en-GB" dirty="0"/>
+              <a:t>: 0.4</a:t>
+            </a:r>
           </a:p>
           <a:p>
             <a:r>
@@ -12234,6 +12948,66 @@
           </a:p>
         </p:txBody>
       </p:sp>
+      <p:pic>
+        <p:nvPicPr>
+          <p:cNvPr id="6" name="Picture 5">
+            <a:extLst>
+              <a:ext uri="{FF2B5EF4-FFF2-40B4-BE49-F238E27FC236}">
+                <a16:creationId xmlns:a16="http://schemas.microsoft.com/office/drawing/2014/main" id="{6793382A-D498-4244-9D85-55FD9D7C014E}"/>
+              </a:ext>
+            </a:extLst>
+          </p:cNvPr>
+          <p:cNvPicPr>
+            <a:picLocks noChangeAspect="1"/>
+          </p:cNvPicPr>
+          <p:nvPr/>
+        </p:nvPicPr>
+        <p:blipFill>
+          <a:blip r:embed="rId2"/>
+          <a:stretch>
+            <a:fillRect/>
+          </a:stretch>
+        </p:blipFill>
+        <p:spPr>
+          <a:xfrm>
+            <a:off x="3906762" y="0"/>
+            <a:ext cx="4378476" cy="6858000"/>
+          </a:xfrm>
+          <a:prstGeom prst="rect">
+            <a:avLst/>
+          </a:prstGeom>
+        </p:spPr>
+      </p:pic>
+      <p:pic>
+        <p:nvPicPr>
+          <p:cNvPr id="12" name="Picture 11">
+            <a:extLst>
+              <a:ext uri="{FF2B5EF4-FFF2-40B4-BE49-F238E27FC236}">
+                <a16:creationId xmlns:a16="http://schemas.microsoft.com/office/drawing/2014/main" id="{32E46E24-7952-2F47-83A9-7CA8A05DBF9A}"/>
+              </a:ext>
+            </a:extLst>
+          </p:cNvPr>
+          <p:cNvPicPr>
+            <a:picLocks noChangeAspect="1"/>
+          </p:cNvPicPr>
+          <p:nvPr/>
+        </p:nvPicPr>
+        <p:blipFill>
+          <a:blip r:embed="rId3"/>
+          <a:stretch>
+            <a:fillRect/>
+          </a:stretch>
+        </p:blipFill>
+        <p:spPr>
+          <a:xfrm>
+            <a:off x="887382" y="148893"/>
+            <a:ext cx="4378476" cy="6858000"/>
+          </a:xfrm>
+          <a:prstGeom prst="rect">
+            <a:avLst/>
+          </a:prstGeom>
+        </p:spPr>
+      </p:pic>
     </p:spTree>
     <p:extLst>
       <p:ext uri="{BB962C8B-B14F-4D97-AF65-F5344CB8AC3E}">
@@ -12280,10 +13054,9 @@
           <a:lstStyle/>
           <a:p>
             <a:r>
-              <a:rPr lang="en-US" smtClean="0"/>
+              <a:rPr lang="en-US"/>
               <a:t>9/5/2019</a:t>
             </a:r>
-            <a:endParaRPr lang="en-US"/>
           </a:p>
         </p:txBody>
       </p:sp>
@@ -12619,10 +13392,9 @@
           <a:lstStyle/>
           <a:p>
             <a:r>
-              <a:rPr lang="en-US" smtClean="0"/>
+              <a:rPr lang="en-US"/>
               <a:t>9/5/2019</a:t>
             </a:r>
-            <a:endParaRPr lang="en-US"/>
           </a:p>
         </p:txBody>
       </p:sp>
@@ -12958,10 +13730,9 @@
           <a:lstStyle/>
           <a:p>
             <a:r>
-              <a:rPr lang="en-US" smtClean="0"/>
+              <a:rPr lang="en-US"/>
               <a:t>9/5/2019</a:t>
             </a:r>
-            <a:endParaRPr lang="en-US"/>
           </a:p>
         </p:txBody>
       </p:sp>
@@ -13333,10 +14104,9 @@
           <a:lstStyle/>
           <a:p>
             <a:r>
-              <a:rPr lang="en-US" smtClean="0"/>
+              <a:rPr lang="en-US"/>
               <a:t>9/5/2019</a:t>
             </a:r>
-            <a:endParaRPr lang="en-US"/>
           </a:p>
         </p:txBody>
       </p:sp>
@@ -13453,15 +14223,15 @@
           <a:lstStyle/>
           <a:p>
             <a:r>
-              <a:rPr lang="en-US" dirty="0" smtClean="0"/>
+              <a:rPr lang="en-US" dirty="0"/>
               <a:t>Expected Yields vs </a:t>
             </a:r>
             <a:r>
-              <a:rPr lang="en-US" dirty="0" err="1" smtClean="0"/>
+              <a:rPr lang="en-US" dirty="0" err="1"/>
               <a:t>JetMassSoftDrop</a:t>
             </a:r>
             <a:r>
-              <a:rPr lang="en-US" dirty="0" smtClean="0"/>
+              <a:rPr lang="en-US" dirty="0"/>
               <a:t> (double fill)</a:t>
             </a:r>
             <a:endParaRPr lang="en-GB" dirty="0"/>
@@ -13550,10 +14320,9 @@
           <a:lstStyle/>
           <a:p>
             <a:r>
-              <a:rPr lang="en-US" smtClean="0"/>
+              <a:rPr lang="en-US"/>
               <a:t>9/5/2019</a:t>
             </a:r>
-            <a:endParaRPr lang="en-US"/>
           </a:p>
         </p:txBody>
       </p:sp>
@@ -13670,15 +14439,15 @@
           <a:lstStyle/>
           <a:p>
             <a:r>
-              <a:rPr lang="en-US" dirty="0" smtClean="0"/>
+              <a:rPr lang="en-US" dirty="0"/>
               <a:t>Expected Yields vs </a:t>
             </a:r>
             <a:r>
-              <a:rPr lang="en-US" dirty="0" err="1" smtClean="0"/>
+              <a:rPr lang="en-US" dirty="0" err="1"/>
               <a:t>JetMassSoftDrop</a:t>
             </a:r>
             <a:r>
-              <a:rPr lang="en-US" dirty="0" smtClean="0"/>
+              <a:rPr lang="en-US" dirty="0"/>
               <a:t> (double fill)</a:t>
             </a:r>
             <a:endParaRPr lang="en-GB" dirty="0"/>
@@ -13767,10 +14536,9 @@
           <a:lstStyle/>
           <a:p>
             <a:r>
-              <a:rPr lang="en-US" smtClean="0"/>
+              <a:rPr lang="en-US"/>
               <a:t>9/5/2019</a:t>
             </a:r>
-            <a:endParaRPr lang="en-US"/>
           </a:p>
         </p:txBody>
       </p:sp>
@@ -13887,15 +14655,15 @@
           <a:lstStyle/>
           <a:p>
             <a:r>
-              <a:rPr lang="en-US" dirty="0" smtClean="0"/>
+              <a:rPr lang="en-US" dirty="0"/>
               <a:t>Expected Yields vs </a:t>
             </a:r>
             <a:r>
-              <a:rPr lang="en-US" dirty="0" err="1" smtClean="0"/>
+              <a:rPr lang="en-US" dirty="0" err="1"/>
               <a:t>JetMassSoftDrop</a:t>
             </a:r>
             <a:r>
-              <a:rPr lang="en-US" dirty="0" smtClean="0"/>
+              <a:rPr lang="en-US" dirty="0"/>
               <a:t> (double fill)</a:t>
             </a:r>
             <a:endParaRPr lang="en-GB" dirty="0"/>
@@ -13978,10 +14746,9 @@
           <a:lstStyle/>
           <a:p>
             <a:r>
-              <a:rPr lang="en-US" smtClean="0"/>
+              <a:rPr lang="en-US"/>
               <a:t>9/5/2019</a:t>
             </a:r>
-            <a:endParaRPr lang="en-US"/>
           </a:p>
         </p:txBody>
       </p:sp>
@@ -14082,13 +14849,8 @@
             </a:r>
             <a:r>
               <a:rPr lang="en-GB" dirty="0"/>
-              <a:t>: </a:t>
-            </a:r>
-            <a:r>
-              <a:rPr lang="en-GB" dirty="0" smtClean="0"/>
-              <a:t>0.0 </a:t>
-            </a:r>
-            <a:endParaRPr lang="en-GB" dirty="0"/>
+              <a:t>: 0.0 </a:t>
+            </a:r>
           </a:p>
           <a:p>
             <a:r>
@@ -14182,6 +14944,66 @@
           </a:p>
         </p:txBody>
       </p:sp>
+      <p:pic>
+        <p:nvPicPr>
+          <p:cNvPr id="7" name="Picture 6">
+            <a:extLst>
+              <a:ext uri="{FF2B5EF4-FFF2-40B4-BE49-F238E27FC236}">
+                <a16:creationId xmlns:a16="http://schemas.microsoft.com/office/drawing/2014/main" id="{55169459-F7AD-264F-85F0-1188F27C0196}"/>
+              </a:ext>
+            </a:extLst>
+          </p:cNvPr>
+          <p:cNvPicPr>
+            <a:picLocks noChangeAspect="1"/>
+          </p:cNvPicPr>
+          <p:nvPr/>
+        </p:nvPicPr>
+        <p:blipFill>
+          <a:blip r:embed="rId2"/>
+          <a:stretch>
+            <a:fillRect/>
+          </a:stretch>
+        </p:blipFill>
+        <p:spPr>
+          <a:xfrm>
+            <a:off x="3906762" y="0"/>
+            <a:ext cx="4378476" cy="6858000"/>
+          </a:xfrm>
+          <a:prstGeom prst="rect">
+            <a:avLst/>
+          </a:prstGeom>
+        </p:spPr>
+      </p:pic>
+      <p:pic>
+        <p:nvPicPr>
+          <p:cNvPr id="12" name="Picture 11">
+            <a:extLst>
+              <a:ext uri="{FF2B5EF4-FFF2-40B4-BE49-F238E27FC236}">
+                <a16:creationId xmlns:a16="http://schemas.microsoft.com/office/drawing/2014/main" id="{564BC618-4B6A-1241-8521-A6ED7DA66952}"/>
+              </a:ext>
+            </a:extLst>
+          </p:cNvPr>
+          <p:cNvPicPr>
+            <a:picLocks noChangeAspect="1"/>
+          </p:cNvPicPr>
+          <p:nvPr/>
+        </p:nvPicPr>
+        <p:blipFill>
+          <a:blip r:embed="rId3"/>
+          <a:stretch>
+            <a:fillRect/>
+          </a:stretch>
+        </p:blipFill>
+        <p:spPr>
+          <a:xfrm>
+            <a:off x="5160677" y="148893"/>
+            <a:ext cx="4378476" cy="6858000"/>
+          </a:xfrm>
+          <a:prstGeom prst="rect">
+            <a:avLst/>
+          </a:prstGeom>
+        </p:spPr>
+      </p:pic>
     </p:spTree>
     <p:extLst>
       <p:ext uri="{BB962C8B-B14F-4D97-AF65-F5344CB8AC3E}">
@@ -14234,10 +15056,9 @@
           <a:lstStyle/>
           <a:p>
             <a:r>
-              <a:rPr lang="en-US" smtClean="0"/>
+              <a:rPr lang="en-US"/>
               <a:t>9/5/2019</a:t>
             </a:r>
-            <a:endParaRPr lang="en-US"/>
           </a:p>
         </p:txBody>
       </p:sp>
@@ -14354,15 +15175,15 @@
           <a:lstStyle/>
           <a:p>
             <a:r>
-              <a:rPr lang="en-US" dirty="0" smtClean="0"/>
+              <a:rPr lang="en-US" dirty="0"/>
               <a:t>Expected Yields vs </a:t>
             </a:r>
             <a:r>
-              <a:rPr lang="en-US" dirty="0" err="1" smtClean="0"/>
+              <a:rPr lang="en-US" dirty="0" err="1"/>
               <a:t>JetMassSoftDrop</a:t>
             </a:r>
             <a:r>
-              <a:rPr lang="en-US" dirty="0" smtClean="0"/>
+              <a:rPr lang="en-US" dirty="0"/>
               <a:t> (double fill)</a:t>
             </a:r>
             <a:endParaRPr lang="en-GB" dirty="0"/>
@@ -14451,10 +15272,9 @@
           <a:lstStyle/>
           <a:p>
             <a:r>
-              <a:rPr lang="en-US" smtClean="0"/>
+              <a:rPr lang="en-US"/>
               <a:t>9/5/2019</a:t>
             </a:r>
-            <a:endParaRPr lang="en-US"/>
           </a:p>
         </p:txBody>
       </p:sp>
@@ -14571,15 +15391,15 @@
           <a:lstStyle/>
           <a:p>
             <a:r>
-              <a:rPr lang="en-US" dirty="0" smtClean="0"/>
+              <a:rPr lang="en-US" dirty="0"/>
               <a:t>Expected Yields vs </a:t>
             </a:r>
             <a:r>
-              <a:rPr lang="en-US" dirty="0" err="1" smtClean="0"/>
+              <a:rPr lang="en-US" dirty="0" err="1"/>
               <a:t>JetMassSoftDrop</a:t>
             </a:r>
             <a:r>
-              <a:rPr lang="en-US" dirty="0" smtClean="0"/>
+              <a:rPr lang="en-US" dirty="0"/>
               <a:t> (double fill)</a:t>
             </a:r>
             <a:endParaRPr lang="en-GB" dirty="0"/>
@@ -14668,10 +15488,9 @@
           <a:lstStyle/>
           <a:p>
             <a:r>
-              <a:rPr lang="en-US" smtClean="0"/>
+              <a:rPr lang="en-US"/>
               <a:t>9/5/2019</a:t>
             </a:r>
-            <a:endParaRPr lang="en-US"/>
           </a:p>
         </p:txBody>
       </p:sp>
@@ -14788,15 +15607,15 @@
           <a:lstStyle/>
           <a:p>
             <a:r>
-              <a:rPr lang="en-US" dirty="0" smtClean="0"/>
+              <a:rPr lang="en-US" dirty="0"/>
               <a:t>Expected Yields vs </a:t>
             </a:r>
             <a:r>
-              <a:rPr lang="en-US" dirty="0" err="1" smtClean="0"/>
+              <a:rPr lang="en-US" dirty="0" err="1"/>
               <a:t>JetMassSoftDrop</a:t>
             </a:r>
             <a:r>
-              <a:rPr lang="en-US" dirty="0" smtClean="0"/>
+              <a:rPr lang="en-US" dirty="0"/>
               <a:t> (double fill)</a:t>
             </a:r>
             <a:endParaRPr lang="en-GB" dirty="0"/>
@@ -14885,10 +15704,9 @@
           <a:lstStyle/>
           <a:p>
             <a:r>
-              <a:rPr lang="en-US" smtClean="0"/>
+              <a:rPr lang="en-US"/>
               <a:t>9/5/2019</a:t>
             </a:r>
-            <a:endParaRPr lang="en-US"/>
           </a:p>
         </p:txBody>
       </p:sp>
@@ -15005,15 +15823,15 @@
           <a:lstStyle/>
           <a:p>
             <a:r>
-              <a:rPr lang="en-US" dirty="0" smtClean="0"/>
+              <a:rPr lang="en-US" dirty="0"/>
               <a:t>Expected Yields vs </a:t>
             </a:r>
             <a:r>
-              <a:rPr lang="en-US" dirty="0" err="1" smtClean="0"/>
+              <a:rPr lang="en-US" dirty="0" err="1"/>
               <a:t>JetMassSoftDrop</a:t>
             </a:r>
             <a:r>
-              <a:rPr lang="en-US" dirty="0" smtClean="0"/>
+              <a:rPr lang="en-US" dirty="0"/>
               <a:t> (double fill)</a:t>
             </a:r>
             <a:endParaRPr lang="en-GB" dirty="0"/>
@@ -15102,10 +15920,9 @@
           <a:lstStyle/>
           <a:p>
             <a:r>
-              <a:rPr lang="en-US" smtClean="0"/>
+              <a:rPr lang="en-US"/>
               <a:t>9/5/2019</a:t>
             </a:r>
-            <a:endParaRPr lang="en-US"/>
           </a:p>
         </p:txBody>
       </p:sp>
@@ -15222,15 +16039,15 @@
           <a:lstStyle/>
           <a:p>
             <a:r>
-              <a:rPr lang="en-US" dirty="0" smtClean="0"/>
+              <a:rPr lang="en-US" dirty="0"/>
               <a:t>Expected Yields vs </a:t>
             </a:r>
             <a:r>
-              <a:rPr lang="en-US" dirty="0" err="1" smtClean="0"/>
+              <a:rPr lang="en-US" dirty="0" err="1"/>
               <a:t>JetMassSoftDrop</a:t>
             </a:r>
             <a:r>
-              <a:rPr lang="en-US" dirty="0" smtClean="0"/>
+              <a:rPr lang="en-US" dirty="0"/>
               <a:t> (double fill)</a:t>
             </a:r>
             <a:endParaRPr lang="en-GB" dirty="0"/>
@@ -15319,10 +16136,9 @@
           <a:lstStyle/>
           <a:p>
             <a:r>
-              <a:rPr lang="en-US" smtClean="0"/>
+              <a:rPr lang="en-US"/>
               <a:t>9/5/2019</a:t>
             </a:r>
-            <a:endParaRPr lang="en-US"/>
           </a:p>
         </p:txBody>
       </p:sp>
@@ -15439,15 +16255,15 @@
           <a:lstStyle/>
           <a:p>
             <a:r>
-              <a:rPr lang="en-US" dirty="0" smtClean="0"/>
+              <a:rPr lang="en-US" dirty="0"/>
               <a:t>Expected Yields vs </a:t>
             </a:r>
             <a:r>
-              <a:rPr lang="en-US" dirty="0" err="1" smtClean="0"/>
+              <a:rPr lang="en-US" dirty="0" err="1"/>
               <a:t>JetMassSoftDrop</a:t>
             </a:r>
             <a:r>
-              <a:rPr lang="en-US" dirty="0" smtClean="0"/>
+              <a:rPr lang="en-US" dirty="0"/>
               <a:t> (double fill)</a:t>
             </a:r>
             <a:endParaRPr lang="en-GB" dirty="0"/>
@@ -15536,10 +16352,9 @@
           <a:lstStyle/>
           <a:p>
             <a:r>
-              <a:rPr lang="en-US" smtClean="0"/>
+              <a:rPr lang="en-US"/>
               <a:t>9/5/2019</a:t>
             </a:r>
-            <a:endParaRPr lang="en-US"/>
           </a:p>
         </p:txBody>
       </p:sp>
@@ -15656,15 +16471,15 @@
           <a:lstStyle/>
           <a:p>
             <a:r>
-              <a:rPr lang="en-US" dirty="0" smtClean="0"/>
+              <a:rPr lang="en-US" dirty="0"/>
               <a:t>Expected Yields vs </a:t>
             </a:r>
             <a:r>
-              <a:rPr lang="en-US" dirty="0" err="1" smtClean="0"/>
+              <a:rPr lang="en-US" dirty="0" err="1"/>
               <a:t>JetMassSoftDrop</a:t>
             </a:r>
             <a:r>
-              <a:rPr lang="en-US" dirty="0" smtClean="0"/>
+              <a:rPr lang="en-US" dirty="0"/>
               <a:t> (double fill)</a:t>
             </a:r>
             <a:endParaRPr lang="en-GB" dirty="0"/>
@@ -15753,10 +16568,9 @@
           <a:lstStyle/>
           <a:p>
             <a:r>
-              <a:rPr lang="en-US" smtClean="0"/>
+              <a:rPr lang="en-US"/>
               <a:t>9/5/2019</a:t>
             </a:r>
-            <a:endParaRPr lang="en-US"/>
           </a:p>
         </p:txBody>
       </p:sp>
@@ -15873,15 +16687,15 @@
           <a:lstStyle/>
           <a:p>
             <a:r>
-              <a:rPr lang="en-US" dirty="0" smtClean="0"/>
+              <a:rPr lang="en-US" dirty="0"/>
               <a:t>Expected Yields vs </a:t>
             </a:r>
             <a:r>
-              <a:rPr lang="en-US" dirty="0" err="1" smtClean="0"/>
+              <a:rPr lang="en-US" dirty="0" err="1"/>
               <a:t>JetMassSoftDrop</a:t>
             </a:r>
             <a:r>
-              <a:rPr lang="en-US" dirty="0" smtClean="0"/>
+              <a:rPr lang="en-US" dirty="0"/>
               <a:t> (double fill)</a:t>
             </a:r>
             <a:endParaRPr lang="en-GB" dirty="0"/>
@@ -15970,10 +16784,9 @@
           <a:lstStyle/>
           <a:p>
             <a:r>
-              <a:rPr lang="en-US" smtClean="0"/>
+              <a:rPr lang="en-US"/>
               <a:t>9/5/2019</a:t>
             </a:r>
-            <a:endParaRPr lang="en-US"/>
           </a:p>
         </p:txBody>
       </p:sp>
@@ -16090,15 +16903,15 @@
           <a:lstStyle/>
           <a:p>
             <a:r>
-              <a:rPr lang="en-US" dirty="0" smtClean="0"/>
+              <a:rPr lang="en-US" dirty="0"/>
               <a:t>Expected Yields vs </a:t>
             </a:r>
             <a:r>
-              <a:rPr lang="en-US" dirty="0" err="1" smtClean="0"/>
+              <a:rPr lang="en-US" dirty="0" err="1"/>
               <a:t>JetMassSoftDrop</a:t>
             </a:r>
             <a:r>
-              <a:rPr lang="en-US" dirty="0" smtClean="0"/>
+              <a:rPr lang="en-US" dirty="0"/>
               <a:t> (double fill)</a:t>
             </a:r>
             <a:endParaRPr lang="en-GB" dirty="0"/>
@@ -16187,10 +17000,9 @@
           <a:lstStyle/>
           <a:p>
             <a:r>
-              <a:rPr lang="en-US" smtClean="0"/>
+              <a:rPr lang="en-US"/>
               <a:t>9/5/2019</a:t>
             </a:r>
-            <a:endParaRPr lang="en-US"/>
           </a:p>
         </p:txBody>
       </p:sp>
@@ -16307,15 +17119,15 @@
           <a:lstStyle/>
           <a:p>
             <a:r>
-              <a:rPr lang="en-US" dirty="0" smtClean="0"/>
+              <a:rPr lang="en-US" dirty="0"/>
               <a:t>Expected Yields vs </a:t>
             </a:r>
             <a:r>
-              <a:rPr lang="en-US" dirty="0" err="1" smtClean="0"/>
+              <a:rPr lang="en-US" dirty="0" err="1"/>
               <a:t>JetMassSoftDrop</a:t>
             </a:r>
             <a:r>
-              <a:rPr lang="en-US" dirty="0" smtClean="0"/>
+              <a:rPr lang="en-US" dirty="0"/>
               <a:t> (double fill)</a:t>
             </a:r>
             <a:endParaRPr lang="en-GB" dirty="0"/>
@@ -16398,10 +17210,9 @@
           <a:lstStyle/>
           <a:p>
             <a:r>
-              <a:rPr lang="en-US" smtClean="0"/>
+              <a:rPr lang="en-US"/>
               <a:t>9/5/2019</a:t>
             </a:r>
-            <a:endParaRPr lang="en-US"/>
           </a:p>
         </p:txBody>
       </p:sp>
@@ -16502,13 +17313,8 @@
             </a:r>
             <a:r>
               <a:rPr lang="en-GB" dirty="0"/>
-              <a:t>: </a:t>
-            </a:r>
-            <a:r>
-              <a:rPr lang="en-GB" dirty="0" smtClean="0"/>
-              <a:t>0.1</a:t>
-            </a:r>
-            <a:endParaRPr lang="en-GB" dirty="0"/>
+              <a:t>: 0.1</a:t>
+            </a:r>
           </a:p>
           <a:p>
             <a:r>
@@ -16602,6 +17408,66 @@
           </a:p>
         </p:txBody>
       </p:sp>
+      <p:pic>
+        <p:nvPicPr>
+          <p:cNvPr id="7" name="Picture 6">
+            <a:extLst>
+              <a:ext uri="{FF2B5EF4-FFF2-40B4-BE49-F238E27FC236}">
+                <a16:creationId xmlns:a16="http://schemas.microsoft.com/office/drawing/2014/main" id="{A5615ACB-A26A-B84E-A082-2C7A09FCDC20}"/>
+              </a:ext>
+            </a:extLst>
+          </p:cNvPr>
+          <p:cNvPicPr>
+            <a:picLocks noChangeAspect="1"/>
+          </p:cNvPicPr>
+          <p:nvPr/>
+        </p:nvPicPr>
+        <p:blipFill>
+          <a:blip r:embed="rId2"/>
+          <a:stretch>
+            <a:fillRect/>
+          </a:stretch>
+        </p:blipFill>
+        <p:spPr>
+          <a:xfrm>
+            <a:off x="3906762" y="0"/>
+            <a:ext cx="4378476" cy="6858000"/>
+          </a:xfrm>
+          <a:prstGeom prst="rect">
+            <a:avLst/>
+          </a:prstGeom>
+        </p:spPr>
+      </p:pic>
+      <p:pic>
+        <p:nvPicPr>
+          <p:cNvPr id="12" name="Picture 11">
+            <a:extLst>
+              <a:ext uri="{FF2B5EF4-FFF2-40B4-BE49-F238E27FC236}">
+                <a16:creationId xmlns:a16="http://schemas.microsoft.com/office/drawing/2014/main" id="{AA152345-6799-9B46-992E-DC25A05974D2}"/>
+              </a:ext>
+            </a:extLst>
+          </p:cNvPr>
+          <p:cNvPicPr>
+            <a:picLocks noChangeAspect="1"/>
+          </p:cNvPicPr>
+          <p:nvPr/>
+        </p:nvPicPr>
+        <p:blipFill>
+          <a:blip r:embed="rId3"/>
+          <a:stretch>
+            <a:fillRect/>
+          </a:stretch>
+        </p:blipFill>
+        <p:spPr>
+          <a:xfrm>
+            <a:off x="4736904" y="33090"/>
+            <a:ext cx="4378476" cy="6858000"/>
+          </a:xfrm>
+          <a:prstGeom prst="rect">
+            <a:avLst/>
+          </a:prstGeom>
+        </p:spPr>
+      </p:pic>
     </p:spTree>
     <p:extLst>
       <p:ext uri="{BB962C8B-B14F-4D97-AF65-F5344CB8AC3E}">
@@ -16654,10 +17520,9 @@
           <a:lstStyle/>
           <a:p>
             <a:r>
-              <a:rPr lang="en-US" smtClean="0"/>
+              <a:rPr lang="en-US"/>
               <a:t>9/5/2019</a:t>
             </a:r>
-            <a:endParaRPr lang="en-US"/>
           </a:p>
         </p:txBody>
       </p:sp>
@@ -16774,15 +17639,15 @@
           <a:lstStyle/>
           <a:p>
             <a:r>
-              <a:rPr lang="en-US" dirty="0" smtClean="0"/>
+              <a:rPr lang="en-US" dirty="0"/>
               <a:t>Expected Yields vs </a:t>
             </a:r>
             <a:r>
-              <a:rPr lang="en-US" dirty="0" err="1" smtClean="0"/>
+              <a:rPr lang="en-US" dirty="0" err="1"/>
               <a:t>JetMassSoftDrop</a:t>
             </a:r>
             <a:r>
-              <a:rPr lang="en-US" dirty="0" smtClean="0"/>
+              <a:rPr lang="en-US" dirty="0"/>
               <a:t> (double fill)</a:t>
             </a:r>
             <a:endParaRPr lang="en-GB" dirty="0"/>
@@ -16871,10 +17736,9 @@
           <a:lstStyle/>
           <a:p>
             <a:r>
-              <a:rPr lang="en-US" smtClean="0"/>
+              <a:rPr lang="en-US"/>
               <a:t>9/5/2019</a:t>
             </a:r>
-            <a:endParaRPr lang="en-US"/>
           </a:p>
         </p:txBody>
       </p:sp>
@@ -16991,15 +17855,15 @@
           <a:lstStyle/>
           <a:p>
             <a:r>
-              <a:rPr lang="en-US" dirty="0" smtClean="0"/>
+              <a:rPr lang="en-US" dirty="0"/>
               <a:t>Expected Yields vs </a:t>
             </a:r>
             <a:r>
-              <a:rPr lang="en-US" dirty="0" err="1" smtClean="0"/>
+              <a:rPr lang="en-US" dirty="0" err="1"/>
               <a:t>JetMassSoftDrop</a:t>
             </a:r>
             <a:r>
-              <a:rPr lang="en-US" dirty="0" smtClean="0"/>
+              <a:rPr lang="en-US" dirty="0"/>
               <a:t> (double fill)</a:t>
             </a:r>
             <a:endParaRPr lang="en-GB" dirty="0"/>
@@ -17088,10 +17952,9 @@
           <a:lstStyle/>
           <a:p>
             <a:r>
-              <a:rPr lang="en-US" smtClean="0"/>
+              <a:rPr lang="en-US"/>
               <a:t>9/5/2019</a:t>
             </a:r>
-            <a:endParaRPr lang="en-US"/>
           </a:p>
         </p:txBody>
       </p:sp>
@@ -17208,15 +18071,15 @@
           <a:lstStyle/>
           <a:p>
             <a:r>
-              <a:rPr lang="en-US" dirty="0" smtClean="0"/>
+              <a:rPr lang="en-US" dirty="0"/>
               <a:t>Expected Yields vs </a:t>
             </a:r>
             <a:r>
-              <a:rPr lang="en-US" dirty="0" err="1" smtClean="0"/>
+              <a:rPr lang="en-US" dirty="0" err="1"/>
               <a:t>JetMassSoftDrop</a:t>
             </a:r>
             <a:r>
-              <a:rPr lang="en-US" dirty="0" smtClean="0"/>
+              <a:rPr lang="en-US" dirty="0"/>
               <a:t> (double fill)</a:t>
             </a:r>
             <a:endParaRPr lang="en-GB" dirty="0"/>
@@ -17299,10 +18162,9 @@
           <a:lstStyle/>
           <a:p>
             <a:r>
-              <a:rPr lang="en-US" smtClean="0"/>
+              <a:rPr lang="en-US"/>
               <a:t>9/5/2019</a:t>
             </a:r>
-            <a:endParaRPr lang="en-US"/>
           </a:p>
         </p:txBody>
       </p:sp>
@@ -17403,13 +18265,8 @@
             </a:r>
             <a:r>
               <a:rPr lang="en-GB" dirty="0"/>
-              <a:t>: </a:t>
-            </a:r>
-            <a:r>
-              <a:rPr lang="en-GB" dirty="0" smtClean="0"/>
-              <a:t>0.2</a:t>
-            </a:r>
-            <a:endParaRPr lang="en-GB" dirty="0"/>
+              <a:t>: 0.2</a:t>
+            </a:r>
           </a:p>
           <a:p>
             <a:r>
@@ -17503,6 +18360,66 @@
           </a:p>
         </p:txBody>
       </p:sp>
+      <p:pic>
+        <p:nvPicPr>
+          <p:cNvPr id="7" name="Picture 6">
+            <a:extLst>
+              <a:ext uri="{FF2B5EF4-FFF2-40B4-BE49-F238E27FC236}">
+                <a16:creationId xmlns:a16="http://schemas.microsoft.com/office/drawing/2014/main" id="{1EF6B74F-49EA-A248-A132-1BEAF592ED9A}"/>
+              </a:ext>
+            </a:extLst>
+          </p:cNvPr>
+          <p:cNvPicPr>
+            <a:picLocks noChangeAspect="1"/>
+          </p:cNvPicPr>
+          <p:nvPr/>
+        </p:nvPicPr>
+        <p:blipFill>
+          <a:blip r:embed="rId2"/>
+          <a:stretch>
+            <a:fillRect/>
+          </a:stretch>
+        </p:blipFill>
+        <p:spPr>
+          <a:xfrm>
+            <a:off x="3906762" y="0"/>
+            <a:ext cx="4378476" cy="6858000"/>
+          </a:xfrm>
+          <a:prstGeom prst="rect">
+            <a:avLst/>
+          </a:prstGeom>
+        </p:spPr>
+      </p:pic>
+      <p:pic>
+        <p:nvPicPr>
+          <p:cNvPr id="12" name="Picture 11">
+            <a:extLst>
+              <a:ext uri="{FF2B5EF4-FFF2-40B4-BE49-F238E27FC236}">
+                <a16:creationId xmlns:a16="http://schemas.microsoft.com/office/drawing/2014/main" id="{C4F5DA0A-1D3B-F349-818D-AF0EA2E59168}"/>
+              </a:ext>
+            </a:extLst>
+          </p:cNvPr>
+          <p:cNvPicPr>
+            <a:picLocks noChangeAspect="1"/>
+          </p:cNvPicPr>
+          <p:nvPr/>
+        </p:nvPicPr>
+        <p:blipFill>
+          <a:blip r:embed="rId3"/>
+          <a:stretch>
+            <a:fillRect/>
+          </a:stretch>
+        </p:blipFill>
+        <p:spPr>
+          <a:xfrm>
+            <a:off x="3395212" y="-302849"/>
+            <a:ext cx="4378476" cy="6858000"/>
+          </a:xfrm>
+          <a:prstGeom prst="rect">
+            <a:avLst/>
+          </a:prstGeom>
+        </p:spPr>
+      </p:pic>
     </p:spTree>
     <p:extLst>
       <p:ext uri="{BB962C8B-B14F-4D97-AF65-F5344CB8AC3E}">
@@ -17549,10 +18466,9 @@
           <a:lstStyle/>
           <a:p>
             <a:r>
-              <a:rPr lang="en-US" smtClean="0"/>
+              <a:rPr lang="en-US"/>
               <a:t>9/5/2019</a:t>
             </a:r>
-            <a:endParaRPr lang="en-US"/>
           </a:p>
         </p:txBody>
       </p:sp>
@@ -17653,13 +18569,8 @@
             </a:r>
             <a:r>
               <a:rPr lang="en-GB" dirty="0"/>
-              <a:t>: </a:t>
-            </a:r>
-            <a:r>
-              <a:rPr lang="en-GB" dirty="0" smtClean="0"/>
-              <a:t>0.3</a:t>
-            </a:r>
-            <a:endParaRPr lang="en-GB" dirty="0"/>
+              <a:t>: 0.3</a:t>
+            </a:r>
           </a:p>
           <a:p>
             <a:r>
@@ -17753,6 +18664,66 @@
           </a:p>
         </p:txBody>
       </p:sp>
+      <p:pic>
+        <p:nvPicPr>
+          <p:cNvPr id="7" name="Picture 6">
+            <a:extLst>
+              <a:ext uri="{FF2B5EF4-FFF2-40B4-BE49-F238E27FC236}">
+                <a16:creationId xmlns:a16="http://schemas.microsoft.com/office/drawing/2014/main" id="{DD83DFBF-203A-B74A-A388-7F33B39C47F4}"/>
+              </a:ext>
+            </a:extLst>
+          </p:cNvPr>
+          <p:cNvPicPr>
+            <a:picLocks noChangeAspect="1"/>
+          </p:cNvPicPr>
+          <p:nvPr/>
+        </p:nvPicPr>
+        <p:blipFill>
+          <a:blip r:embed="rId2"/>
+          <a:stretch>
+            <a:fillRect/>
+          </a:stretch>
+        </p:blipFill>
+        <p:spPr>
+          <a:xfrm>
+            <a:off x="3906762" y="0"/>
+            <a:ext cx="4378476" cy="6858000"/>
+          </a:xfrm>
+          <a:prstGeom prst="rect">
+            <a:avLst/>
+          </a:prstGeom>
+        </p:spPr>
+      </p:pic>
+      <p:pic>
+        <p:nvPicPr>
+          <p:cNvPr id="12" name="Picture 11">
+            <a:extLst>
+              <a:ext uri="{FF2B5EF4-FFF2-40B4-BE49-F238E27FC236}">
+                <a16:creationId xmlns:a16="http://schemas.microsoft.com/office/drawing/2014/main" id="{A3957916-89D7-B140-9411-9DC9A8018559}"/>
+              </a:ext>
+            </a:extLst>
+          </p:cNvPr>
+          <p:cNvPicPr>
+            <a:picLocks noChangeAspect="1"/>
+          </p:cNvPicPr>
+          <p:nvPr/>
+        </p:nvPicPr>
+        <p:blipFill>
+          <a:blip r:embed="rId3"/>
+          <a:stretch>
+            <a:fillRect/>
+          </a:stretch>
+        </p:blipFill>
+        <p:spPr>
+          <a:xfrm>
+            <a:off x="868763" y="0"/>
+            <a:ext cx="4378476" cy="6858000"/>
+          </a:xfrm>
+          <a:prstGeom prst="rect">
+            <a:avLst/>
+          </a:prstGeom>
+        </p:spPr>
+      </p:pic>
     </p:spTree>
     <p:extLst>
       <p:ext uri="{BB962C8B-B14F-4D97-AF65-F5344CB8AC3E}">
@@ -17799,10 +18770,9 @@
           <a:lstStyle/>
           <a:p>
             <a:r>
-              <a:rPr lang="en-US" smtClean="0"/>
+              <a:rPr lang="en-US"/>
               <a:t>9/5/2019</a:t>
             </a:r>
-            <a:endParaRPr lang="en-US"/>
           </a:p>
         </p:txBody>
       </p:sp>
@@ -17903,13 +18873,8 @@
             </a:r>
             <a:r>
               <a:rPr lang="en-GB" dirty="0"/>
-              <a:t>: </a:t>
-            </a:r>
-            <a:r>
-              <a:rPr lang="en-GB" dirty="0" smtClean="0"/>
-              <a:t>0.4</a:t>
-            </a:r>
-            <a:endParaRPr lang="en-GB" dirty="0"/>
+              <a:t>: 0.4</a:t>
+            </a:r>
           </a:p>
           <a:p>
             <a:r>
@@ -18003,6 +18968,66 @@
           </a:p>
         </p:txBody>
       </p:sp>
+      <p:pic>
+        <p:nvPicPr>
+          <p:cNvPr id="7" name="Picture 6">
+            <a:extLst>
+              <a:ext uri="{FF2B5EF4-FFF2-40B4-BE49-F238E27FC236}">
+                <a16:creationId xmlns:a16="http://schemas.microsoft.com/office/drawing/2014/main" id="{B9203B54-596D-FF47-A71C-09ED4E692CAA}"/>
+              </a:ext>
+            </a:extLst>
+          </p:cNvPr>
+          <p:cNvPicPr>
+            <a:picLocks noChangeAspect="1"/>
+          </p:cNvPicPr>
+          <p:nvPr/>
+        </p:nvPicPr>
+        <p:blipFill>
+          <a:blip r:embed="rId2"/>
+          <a:stretch>
+            <a:fillRect/>
+          </a:stretch>
+        </p:blipFill>
+        <p:spPr>
+          <a:xfrm>
+            <a:off x="3906762" y="0"/>
+            <a:ext cx="4378476" cy="6858000"/>
+          </a:xfrm>
+          <a:prstGeom prst="rect">
+            <a:avLst/>
+          </a:prstGeom>
+        </p:spPr>
+      </p:pic>
+      <p:pic>
+        <p:nvPicPr>
+          <p:cNvPr id="12" name="Picture 11">
+            <a:extLst>
+              <a:ext uri="{FF2B5EF4-FFF2-40B4-BE49-F238E27FC236}">
+                <a16:creationId xmlns:a16="http://schemas.microsoft.com/office/drawing/2014/main" id="{90587709-0018-D545-B30F-F2D80DA72076}"/>
+              </a:ext>
+            </a:extLst>
+          </p:cNvPr>
+          <p:cNvPicPr>
+            <a:picLocks noChangeAspect="1"/>
+          </p:cNvPicPr>
+          <p:nvPr/>
+        </p:nvPicPr>
+        <p:blipFill>
+          <a:blip r:embed="rId3"/>
+          <a:stretch>
+            <a:fillRect/>
+          </a:stretch>
+        </p:blipFill>
+        <p:spPr>
+          <a:xfrm>
+            <a:off x="1911329" y="-302849"/>
+            <a:ext cx="4378476" cy="6858000"/>
+          </a:xfrm>
+          <a:prstGeom prst="rect">
+            <a:avLst/>
+          </a:prstGeom>
+        </p:spPr>
+      </p:pic>
     </p:spTree>
     <p:extLst>
       <p:ext uri="{BB962C8B-B14F-4D97-AF65-F5344CB8AC3E}">
@@ -18049,10 +19074,9 @@
           <a:lstStyle/>
           <a:p>
             <a:r>
-              <a:rPr lang="en-US" smtClean="0"/>
+              <a:rPr lang="en-US"/>
               <a:t>9/5/2019</a:t>
             </a:r>
-            <a:endParaRPr lang="en-US"/>
           </a:p>
         </p:txBody>
       </p:sp>
@@ -18153,13 +19177,8 @@
             </a:r>
             <a:r>
               <a:rPr lang="en-GB" dirty="0"/>
-              <a:t>: </a:t>
-            </a:r>
-            <a:r>
-              <a:rPr lang="en-GB" dirty="0" smtClean="0"/>
-              <a:t>0.6 </a:t>
-            </a:r>
-            <a:endParaRPr lang="en-GB" dirty="0"/>
+              <a:t>: 0.6 </a:t>
+            </a:r>
           </a:p>
           <a:p>
             <a:r>

</xml_diff>